<commit_message>
Add pyspi tutorial slides
</commit_message>
<xml_diff>
--- a/poster/CNS_2022_Poster_Annie_G_Bryant.pptx
+++ b/poster/CNS_2022_Poster_Annie_G_Bryant.pptx
@@ -197,7 +197,7 @@
           <a:p>
             <a:fld id="{DDCDD90E-30D2-47EF-9516-2B7C5F601918}" type="datetimeFigureOut">
               <a:rPr lang="en-AU" smtClean="0"/>
-              <a:t>12/07/2022</a:t>
+              <a:t>13/07/2022</a:t>
             </a:fld>
             <a:endParaRPr lang="en-AU"/>
           </a:p>
@@ -680,7 +680,7 @@
           <a:p>
             <a:fld id="{2A15C726-7A85-4E76-A962-02FDD2A3E977}" type="datetimeFigureOut">
               <a:rPr lang="en-AU" smtClean="0"/>
-              <a:t>12/07/2022</a:t>
+              <a:t>13/07/2022</a:t>
             </a:fld>
             <a:endParaRPr lang="en-AU"/>
           </a:p>
@@ -850,7 +850,7 @@
           <a:p>
             <a:fld id="{2A15C726-7A85-4E76-A962-02FDD2A3E977}" type="datetimeFigureOut">
               <a:rPr lang="en-AU" smtClean="0"/>
-              <a:t>12/07/2022</a:t>
+              <a:t>13/07/2022</a:t>
             </a:fld>
             <a:endParaRPr lang="en-AU"/>
           </a:p>
@@ -1030,7 +1030,7 @@
           <a:p>
             <a:fld id="{2A15C726-7A85-4E76-A962-02FDD2A3E977}" type="datetimeFigureOut">
               <a:rPr lang="en-AU" smtClean="0"/>
-              <a:t>12/07/2022</a:t>
+              <a:t>13/07/2022</a:t>
             </a:fld>
             <a:endParaRPr lang="en-AU"/>
           </a:p>
@@ -1200,7 +1200,7 @@
           <a:p>
             <a:fld id="{2A15C726-7A85-4E76-A962-02FDD2A3E977}" type="datetimeFigureOut">
               <a:rPr lang="en-AU" smtClean="0"/>
-              <a:t>12/07/2022</a:t>
+              <a:t>13/07/2022</a:t>
             </a:fld>
             <a:endParaRPr lang="en-AU"/>
           </a:p>
@@ -1444,7 +1444,7 @@
           <a:p>
             <a:fld id="{2A15C726-7A85-4E76-A962-02FDD2A3E977}" type="datetimeFigureOut">
               <a:rPr lang="en-AU" smtClean="0"/>
-              <a:t>12/07/2022</a:t>
+              <a:t>13/07/2022</a:t>
             </a:fld>
             <a:endParaRPr lang="en-AU"/>
           </a:p>
@@ -1676,7 +1676,7 @@
           <a:p>
             <a:fld id="{2A15C726-7A85-4E76-A962-02FDD2A3E977}" type="datetimeFigureOut">
               <a:rPr lang="en-AU" smtClean="0"/>
-              <a:t>12/07/2022</a:t>
+              <a:t>13/07/2022</a:t>
             </a:fld>
             <a:endParaRPr lang="en-AU"/>
           </a:p>
@@ -2043,7 +2043,7 @@
           <a:p>
             <a:fld id="{2A15C726-7A85-4E76-A962-02FDD2A3E977}" type="datetimeFigureOut">
               <a:rPr lang="en-AU" smtClean="0"/>
-              <a:t>12/07/2022</a:t>
+              <a:t>13/07/2022</a:t>
             </a:fld>
             <a:endParaRPr lang="en-AU"/>
           </a:p>
@@ -2161,7 +2161,7 @@
           <a:p>
             <a:fld id="{2A15C726-7A85-4E76-A962-02FDD2A3E977}" type="datetimeFigureOut">
               <a:rPr lang="en-AU" smtClean="0"/>
-              <a:t>12/07/2022</a:t>
+              <a:t>13/07/2022</a:t>
             </a:fld>
             <a:endParaRPr lang="en-AU"/>
           </a:p>
@@ -2256,7 +2256,7 @@
           <a:p>
             <a:fld id="{2A15C726-7A85-4E76-A962-02FDD2A3E977}" type="datetimeFigureOut">
               <a:rPr lang="en-AU" smtClean="0"/>
-              <a:t>12/07/2022</a:t>
+              <a:t>13/07/2022</a:t>
             </a:fld>
             <a:endParaRPr lang="en-AU"/>
           </a:p>
@@ -2533,7 +2533,7 @@
           <a:p>
             <a:fld id="{2A15C726-7A85-4E76-A962-02FDD2A3E977}" type="datetimeFigureOut">
               <a:rPr lang="en-AU" smtClean="0"/>
-              <a:t>12/07/2022</a:t>
+              <a:t>13/07/2022</a:t>
             </a:fld>
             <a:endParaRPr lang="en-AU"/>
           </a:p>
@@ -2790,7 +2790,7 @@
           <a:p>
             <a:fld id="{2A15C726-7A85-4E76-A962-02FDD2A3E977}" type="datetimeFigureOut">
               <a:rPr lang="en-AU" smtClean="0"/>
-              <a:t>12/07/2022</a:t>
+              <a:t>13/07/2022</a:t>
             </a:fld>
             <a:endParaRPr lang="en-AU"/>
           </a:p>
@@ -3003,7 +3003,7 @@
           <a:p>
             <a:fld id="{2A15C726-7A85-4E76-A962-02FDD2A3E977}" type="datetimeFigureOut">
               <a:rPr lang="en-AU" smtClean="0"/>
-              <a:t>12/07/2022</a:t>
+              <a:t>13/07/2022</a:t>
             </a:fld>
             <a:endParaRPr lang="en-AU"/>
           </a:p>

</xml_diff>